<commit_message>
add some examples on cassandra
</commit_message>
<xml_diff>
--- a/slides/02 - E2 - Cassandra Intro.pptx
+++ b/slides/02 - E2 - Cassandra Intro.pptx
@@ -267,7 +267,7 @@
           <a:p>
             <a:fld id="{8C81D565-392B-4AB9-9647-420EF17AA3FC}" type="datetimeFigureOut">
               <a:rPr lang="it-IT" smtClean="0"/>
-              <a:t>20/12/2021</a:t>
+              <a:t>21/12/2021</a:t>
             </a:fld>
             <a:endParaRPr lang="it-IT" dirty="0"/>
           </a:p>
@@ -2079,7 +2079,7 @@
           <a:p>
             <a:fld id="{65061730-2F0F-4B55-83F4-33856D80FFD7}" type="datetime1">
               <a:rPr lang="en-US" smtClean="0"/>
-              <a:t>12/20/2021</a:t>
+              <a:t>12/21/2021</a:t>
             </a:fld>
             <a:endParaRPr lang="en-US" dirty="0"/>
           </a:p>
@@ -2287,7 +2287,7 @@
           <a:p>
             <a:fld id="{BE1035D6-F845-4530-B289-DD4EC9CAE501}" type="datetime1">
               <a:rPr lang="en-US" smtClean="0"/>
-              <a:t>12/20/2021</a:t>
+              <a:t>12/21/2021</a:t>
             </a:fld>
             <a:endParaRPr lang="en-US" dirty="0"/>
           </a:p>
@@ -2543,7 +2543,7 @@
           <a:p>
             <a:fld id="{EDD3DE46-844C-40F1-AAA7-78AD6518D44C}" type="datetime1">
               <a:rPr lang="en-US" smtClean="0"/>
-              <a:t>12/20/2021</a:t>
+              <a:t>12/21/2021</a:t>
             </a:fld>
             <a:endParaRPr lang="en-US" dirty="0"/>
           </a:p>
@@ -2715,7 +2715,7 @@
           <a:p>
             <a:fld id="{1FCF7768-7A83-43C9-9C3D-95CD5F68D7E2}" type="datetime1">
               <a:rPr lang="en-US" smtClean="0"/>
-              <a:t>12/20/2021</a:t>
+              <a:t>12/21/2021</a:t>
             </a:fld>
             <a:endParaRPr lang="en-US" dirty="0"/>
           </a:p>
@@ -3058,7 +3058,7 @@
           <a:p>
             <a:fld id="{58DD30C4-1715-4BC2-976F-EF7BA4DC70B4}" type="datetime1">
               <a:rPr lang="en-US" smtClean="0"/>
-              <a:t>12/20/2021</a:t>
+              <a:t>12/21/2021</a:t>
             </a:fld>
             <a:endParaRPr lang="en-US" dirty="0"/>
           </a:p>
@@ -3333,7 +3333,7 @@
           <a:p>
             <a:fld id="{E92CF10C-564E-48D4-BE3A-05BB93A7F107}" type="datetime1">
               <a:rPr lang="en-US" smtClean="0"/>
-              <a:t>12/20/2021</a:t>
+              <a:t>12/21/2021</a:t>
             </a:fld>
             <a:endParaRPr lang="en-US" dirty="0"/>
           </a:p>
@@ -3712,7 +3712,7 @@
           <a:p>
             <a:fld id="{CEF5B9DB-33AD-46E7-ADFD-C52815BFEA09}" type="datetime1">
               <a:rPr lang="en-US" smtClean="0"/>
-              <a:t>12/20/2021</a:t>
+              <a:t>12/21/2021</a:t>
             </a:fld>
             <a:endParaRPr lang="en-US" dirty="0"/>
           </a:p>
@@ -3830,7 +3830,7 @@
           <a:p>
             <a:fld id="{EFC02824-932F-46A1-8D0D-D52979BEE663}" type="datetime1">
               <a:rPr lang="en-US" smtClean="0"/>
-              <a:t>12/20/2021</a:t>
+              <a:t>12/21/2021</a:t>
             </a:fld>
             <a:endParaRPr lang="en-US" dirty="0"/>
           </a:p>
@@ -4001,7 +4001,7 @@
           <a:p>
             <a:fld id="{36233CB2-1968-4F08-9AB4-83693145DE18}" type="datetime1">
               <a:rPr lang="en-US" smtClean="0"/>
-              <a:t>12/20/2021</a:t>
+              <a:t>12/21/2021</a:t>
             </a:fld>
             <a:endParaRPr lang="en-US" dirty="0"/>
           </a:p>
@@ -4356,7 +4356,7 @@
           <a:p>
             <a:fld id="{F8F6D7E5-1322-4764-A2E4-7B71FFFDE726}" type="datetime1">
               <a:rPr lang="en-US" smtClean="0"/>
-              <a:t>12/20/2021</a:t>
+              <a:t>12/21/2021</a:t>
             </a:fld>
             <a:endParaRPr lang="en-US" dirty="0"/>
           </a:p>
@@ -4734,7 +4734,7 @@
           <a:p>
             <a:fld id="{E26D0A1A-929F-4DC6-9A8A-74A15252C912}" type="datetime1">
               <a:rPr lang="en-US" smtClean="0"/>
-              <a:t>12/20/2021</a:t>
+              <a:t>12/21/2021</a:t>
             </a:fld>
             <a:endParaRPr lang="en-US" dirty="0"/>
           </a:p>
@@ -5021,7 +5021,7 @@
           <a:p>
             <a:fld id="{EDD3DE46-844C-40F1-AAA7-78AD6518D44C}" type="datetime1">
               <a:rPr lang="en-US" smtClean="0"/>
-              <a:t>12/20/2021</a:t>
+              <a:t>12/21/2021</a:t>
             </a:fld>
             <a:endParaRPr lang="en-US" dirty="0"/>
           </a:p>
@@ -14442,7 +14442,16 @@
                 </a:solidFill>
                 <a:latin typeface="Courier New" panose="02070309020205020404" pitchFamily="49" charset="0"/>
               </a:rPr>
-              <a:t> ((year), id) );</a:t>
+              <a:t> ((year), </a:t>
+            </a:r>
+            <a:r>
+              <a:rPr lang="en-US" sz="1600">
+                <a:solidFill>
+                  <a:srgbClr val="374C51"/>
+                </a:solidFill>
+                <a:latin typeface="Courier New" panose="02070309020205020404" pitchFamily="49" charset="0"/>
+              </a:rPr>
+              <a:t>id));</a:t>
             </a:r>
             <a:endParaRPr lang="en-US" sz="1600" dirty="0"/>
           </a:p>
@@ -14640,7 +14649,7 @@
                 </a:solidFill>
                 <a:latin typeface="Courier New" panose="02070309020205020404" pitchFamily="49" charset="0"/>
               </a:rPr>
-              <a:t> (id) );</a:t>
+              <a:t> (id));</a:t>
             </a:r>
             <a:endParaRPr lang="en-US" sz="1600" dirty="0"/>
           </a:p>
@@ -14838,7 +14847,7 @@
                 </a:solidFill>
                 <a:latin typeface="Courier New" panose="02070309020205020404" pitchFamily="49" charset="0"/>
               </a:rPr>
-              <a:t> ((year), name, id) );</a:t>
+              <a:t> ((year), name, id));</a:t>
             </a:r>
             <a:endParaRPr lang="en-US" sz="1600" dirty="0"/>
           </a:p>

</xml_diff>

<commit_message>
Quick instructions + other minor fixes (#121)
* Update 01 - T1 - I database NoSQL.pptx

update slides

* Update 01 - T1 - I database NoSQL.pptx

update slides

* change installation instruction, adding git and chocolately

* slide e programma aggiornate

* Refactor and fix, add support to run subgroups of services,

- fix my-sql error
- change instructions and refactor
- start supports a subgroups of services, can run a db and not all

* Delete LinuxMacOS.md

* Update README.md

* change linux/mac script

* add comments

* updates

* fix solution neo4j

* change slides

* fix db name e soluzioni

* fix soluzioni

* Update 06 - E6 - MongoDB find.solution.md

* Update 06 - E6 - MongoDB find.solution.md

* Revert "fix soluzioni"

This reverts commit 5a76167713b7d2ab36186fb8c142c85f113f2033.

* roll back

* Update 06 - E6 - MongoDB find.solution.md
</commit_message>
<xml_diff>
--- a/slides/02 - E2 - Cassandra Intro.pptx
+++ b/slides/02 - E2 - Cassandra Intro.pptx
@@ -268,7 +268,7 @@
           <a:p>
             <a:fld id="{8C81D565-392B-4AB9-9647-420EF17AA3FC}" type="datetimeFigureOut">
               <a:rPr lang="it-IT" smtClean="0"/>
-              <a:t>09/02/2022</a:t>
+              <a:t>17/02/2023</a:t>
             </a:fld>
             <a:endParaRPr lang="it-IT" dirty="0"/>
           </a:p>
@@ -690,42 +690,17 @@
           <a:lstStyle/>
           <a:p>
             <a:r>
-              <a:rPr lang="en-US" dirty="0"/>
-              <a:t>DESCRIBE TABLE</a:t>
-            </a:r>
-            <a:r>
-              <a:rPr lang="en-US" baseline="0" dirty="0"/>
-              <a:t> -&gt; </a:t>
-            </a:r>
-            <a:r>
-              <a:rPr lang="en-US" baseline="0" dirty="0" err="1"/>
-              <a:t>notare</a:t>
-            </a:r>
-            <a:r>
-              <a:rPr lang="en-US" baseline="0" dirty="0"/>
-              <a:t> </a:t>
-            </a:r>
-            <a:r>
-              <a:rPr lang="en-US" baseline="0" dirty="0" err="1"/>
-              <a:t>l'ordine</a:t>
-            </a:r>
-            <a:r>
-              <a:rPr lang="en-US" baseline="0" dirty="0"/>
-              <a:t> </a:t>
-            </a:r>
-            <a:r>
-              <a:rPr lang="en-US" baseline="0" dirty="0" err="1"/>
-              <a:t>delle</a:t>
-            </a:r>
-            <a:r>
-              <a:rPr lang="en-US" baseline="0" dirty="0"/>
-              <a:t> </a:t>
-            </a:r>
-            <a:r>
-              <a:rPr lang="en-US" baseline="0" dirty="0" err="1"/>
-              <a:t>colonne</a:t>
-            </a:r>
-            <a:endParaRPr lang="en-US" dirty="0"/>
+              <a:rPr lang="it-IT" dirty="0"/>
+              <a:t>Punto di partenza: ho un file </a:t>
+            </a:r>
+            <a:r>
+              <a:rPr lang="it-IT" dirty="0" err="1"/>
+              <a:t>csv</a:t>
+            </a:r>
+            <a:r>
+              <a:rPr lang="it-IT" dirty="0"/>
+              <a:t> con </a:t>
+            </a:r>
           </a:p>
         </p:txBody>
       </p:sp>
@@ -746,7 +721,7 @@
           <a:p>
             <a:fld id="{B38CEA09-33FA-4F6C-9D30-5FB0AA0E11C3}" type="slidenum">
               <a:rPr lang="it-IT" smtClean="0"/>
-              <a:t>30</a:t>
+              <a:t>28</a:t>
             </a:fld>
             <a:endParaRPr lang="it-IT" dirty="0"/>
           </a:p>
@@ -755,7 +730,7 @@
     </p:spTree>
     <p:extLst>
       <p:ext uri="{BB962C8B-B14F-4D97-AF65-F5344CB8AC3E}">
-        <p14:creationId xmlns:p14="http://schemas.microsoft.com/office/powerpoint/2010/main" val="199411169"/>
+        <p14:creationId xmlns:p14="http://schemas.microsoft.com/office/powerpoint/2010/main" val="1763239004"/>
       </p:ext>
     </p:extLst>
   </p:cSld>
@@ -809,6 +784,42 @@
           <a:bodyPr/>
           <a:lstStyle/>
           <a:p>
+            <a:r>
+              <a:rPr lang="en-US" dirty="0"/>
+              <a:t>DESCRIBE TABLE</a:t>
+            </a:r>
+            <a:r>
+              <a:rPr lang="en-US" baseline="0" dirty="0"/>
+              <a:t> -&gt; </a:t>
+            </a:r>
+            <a:r>
+              <a:rPr lang="en-US" baseline="0" dirty="0" err="1"/>
+              <a:t>notare</a:t>
+            </a:r>
+            <a:r>
+              <a:rPr lang="en-US" baseline="0" dirty="0"/>
+              <a:t> </a:t>
+            </a:r>
+            <a:r>
+              <a:rPr lang="en-US" baseline="0" dirty="0" err="1"/>
+              <a:t>l'ordine</a:t>
+            </a:r>
+            <a:r>
+              <a:rPr lang="en-US" baseline="0" dirty="0"/>
+              <a:t> </a:t>
+            </a:r>
+            <a:r>
+              <a:rPr lang="en-US" baseline="0" dirty="0" err="1"/>
+              <a:t>delle</a:t>
+            </a:r>
+            <a:r>
+              <a:rPr lang="en-US" baseline="0" dirty="0"/>
+              <a:t> </a:t>
+            </a:r>
+            <a:r>
+              <a:rPr lang="en-US" baseline="0" dirty="0" err="1"/>
+              <a:t>colonne</a:t>
+            </a:r>
             <a:endParaRPr lang="en-US" dirty="0"/>
           </a:p>
         </p:txBody>
@@ -830,7 +841,7 @@
           <a:p>
             <a:fld id="{B38CEA09-33FA-4F6C-9D30-5FB0AA0E11C3}" type="slidenum">
               <a:rPr lang="it-IT" smtClean="0"/>
-              <a:t>42</a:t>
+              <a:t>29</a:t>
             </a:fld>
             <a:endParaRPr lang="it-IT" dirty="0"/>
           </a:p>
@@ -839,7 +850,7 @@
     </p:spTree>
     <p:extLst>
       <p:ext uri="{BB962C8B-B14F-4D97-AF65-F5344CB8AC3E}">
-        <p14:creationId xmlns:p14="http://schemas.microsoft.com/office/powerpoint/2010/main" val="134689389"/>
+        <p14:creationId xmlns:p14="http://schemas.microsoft.com/office/powerpoint/2010/main" val="2128317767"/>
       </p:ext>
     </p:extLst>
   </p:cSld>
@@ -894,96 +905,16 @@
           <a:lstStyle/>
           <a:p>
             <a:r>
-              <a:rPr lang="en-US" dirty="0" err="1"/>
-              <a:t>Attenzione</a:t>
-            </a:r>
-            <a:r>
-              <a:rPr lang="en-US" dirty="0"/>
-              <a:t>! </a:t>
-            </a:r>
-            <a:r>
-              <a:rPr lang="en-US" dirty="0" err="1"/>
-              <a:t>Nel</a:t>
-            </a:r>
-            <a:r>
-              <a:rPr lang="en-US" dirty="0"/>
-              <a:t> </a:t>
-            </a:r>
-            <a:r>
-              <a:rPr lang="en-US" dirty="0" err="1"/>
-              <a:t>corso</a:t>
-            </a:r>
-            <a:r>
-              <a:rPr lang="en-US" dirty="0"/>
-              <a:t> di </a:t>
-            </a:r>
-            <a:r>
-              <a:rPr lang="en-US" dirty="0" err="1"/>
-              <a:t>riferimento</a:t>
-            </a:r>
-            <a:r>
-              <a:rPr lang="en-US" dirty="0"/>
-              <a:t> (DS220) </a:t>
-            </a:r>
-            <a:r>
-              <a:rPr lang="en-US" dirty="0" err="1"/>
-              <a:t>viene</a:t>
-            </a:r>
-            <a:r>
-              <a:rPr lang="en-US" dirty="0"/>
-              <a:t> </a:t>
-            </a:r>
-            <a:r>
-              <a:rPr lang="en-US" dirty="0" err="1"/>
-              <a:t>detta</a:t>
-            </a:r>
-            <a:r>
-              <a:rPr lang="en-US" dirty="0"/>
-              <a:t> </a:t>
-            </a:r>
-            <a:r>
-              <a:rPr lang="en-US" dirty="0" err="1"/>
-              <a:t>una</a:t>
-            </a:r>
-            <a:r>
-              <a:rPr lang="en-US" dirty="0"/>
-              <a:t> </a:t>
-            </a:r>
-            <a:r>
-              <a:rPr lang="en-US" dirty="0" err="1"/>
-              <a:t>cosa</a:t>
-            </a:r>
-            <a:r>
-              <a:rPr lang="en-US" dirty="0"/>
-              <a:t> </a:t>
-            </a:r>
-            <a:r>
-              <a:rPr lang="en-US" dirty="0" err="1"/>
-              <a:t>profondamente</a:t>
-            </a:r>
-            <a:r>
-              <a:rPr lang="en-US" dirty="0"/>
-              <a:t> </a:t>
-            </a:r>
-            <a:r>
-              <a:rPr lang="en-US" dirty="0" err="1"/>
-              <a:t>sbagliata</a:t>
-            </a:r>
-            <a:r>
-              <a:rPr lang="en-US" dirty="0"/>
-              <a:t>, </a:t>
-            </a:r>
-            <a:r>
-              <a:rPr lang="en-US" dirty="0" err="1"/>
-              <a:t>ossia</a:t>
+              <a:rPr lang="en-US" dirty="0"/>
+              <a:t>DESCRIBE TABLE</a:t>
             </a:r>
             <a:r>
               <a:rPr lang="en-US" baseline="0" dirty="0"/>
-              <a:t> </a:t>
+              <a:t> -&gt; </a:t>
             </a:r>
             <a:r>
               <a:rPr lang="en-US" baseline="0" dirty="0" err="1"/>
-              <a:t>che</a:t>
+              <a:t>notare</a:t>
             </a:r>
             <a:r>
               <a:rPr lang="en-US" baseline="0" dirty="0"/>
@@ -991,39 +922,106 @@
             </a:r>
             <a:r>
               <a:rPr lang="en-US" baseline="0" dirty="0" err="1"/>
-              <a:t>il</a:t>
+              <a:t>l'ordine</a:t>
             </a:r>
             <a:r>
               <a:rPr lang="en-US" baseline="0" dirty="0"/>
-              <a:t> DBMS prima fa </a:t>
+              <a:t> </a:t>
             </a:r>
             <a:r>
               <a:rPr lang="en-US" baseline="0" dirty="0" err="1"/>
-              <a:t>il</a:t>
+              <a:t>delle</a:t>
             </a:r>
             <a:r>
               <a:rPr lang="en-US" baseline="0" dirty="0"/>
-              <a:t> join, poi </a:t>
+              <a:t> </a:t>
             </a:r>
             <a:r>
               <a:rPr lang="en-US" baseline="0" dirty="0" err="1"/>
-              <a:t>il</a:t>
-            </a:r>
+              <a:t>colonne</a:t>
+            </a:r>
+            <a:endParaRPr lang="en-US" baseline="0" dirty="0"/>
+          </a:p>
+          <a:p>
+            <a:endParaRPr lang="en-US" baseline="0" dirty="0"/>
+          </a:p>
+          <a:p>
             <a:r>
               <a:rPr lang="en-US" baseline="0" dirty="0"/>
-              <a:t> </a:t>
+              <a:t>(</a:t>
             </a:r>
             <a:r>
               <a:rPr lang="en-US" baseline="0" dirty="0" err="1"/>
-              <a:t>filtro</a:t>
+              <a:t>perchè</a:t>
             </a:r>
             <a:r>
               <a:rPr lang="en-US" baseline="0" dirty="0"/>
-              <a:t>. </a:t>
-            </a:r>
-            <a:endParaRPr lang="en-US" dirty="0"/>
-          </a:p>
-          <a:p>
+              <a:t> TAG come </a:t>
+            </a:r>
+            <a:r>
+              <a:rPr lang="en-US" baseline="0" dirty="0" err="1"/>
+              <a:t>partizionamento</a:t>
+            </a:r>
+            <a:r>
+              <a:rPr lang="en-US" baseline="0" dirty="0"/>
+              <a:t> e non </a:t>
+            </a:r>
+            <a:r>
+              <a:rPr lang="en-US" baseline="0" dirty="0" err="1"/>
+              <a:t>anche</a:t>
+            </a:r>
+            <a:r>
+              <a:rPr lang="en-US" baseline="0" dirty="0"/>
+              <a:t> </a:t>
+            </a:r>
+            <a:r>
+              <a:rPr lang="en-US" baseline="0" dirty="0" err="1"/>
+              <a:t>video_id</a:t>
+            </a:r>
+            <a:r>
+              <a:rPr lang="en-US" baseline="0" dirty="0"/>
+              <a:t>? </a:t>
+            </a:r>
+            <a:r>
+              <a:rPr lang="en-US" baseline="0" dirty="0" err="1"/>
+              <a:t>Video_id</a:t>
+            </a:r>
+            <a:r>
+              <a:rPr lang="en-US" baseline="0" dirty="0"/>
+              <a:t> poi </a:t>
+            </a:r>
+            <a:r>
+              <a:rPr lang="en-US" baseline="0" dirty="0" err="1"/>
+              <a:t>crea</a:t>
+            </a:r>
+            <a:r>
+              <a:rPr lang="en-US" baseline="0" dirty="0"/>
+              <a:t> </a:t>
+            </a:r>
+            <a:r>
+              <a:rPr lang="en-US" baseline="0" dirty="0" err="1"/>
+              <a:t>gruppi</a:t>
+            </a:r>
+            <a:r>
+              <a:rPr lang="en-US" baseline="0" dirty="0"/>
+              <a:t> </a:t>
+            </a:r>
+            <a:r>
+              <a:rPr lang="en-US" baseline="0" dirty="0" err="1"/>
+              <a:t>più</a:t>
+            </a:r>
+            <a:r>
+              <a:rPr lang="en-US" baseline="0" dirty="0"/>
+              <a:t> </a:t>
+            </a:r>
+            <a:r>
+              <a:rPr lang="en-US" baseline="0" dirty="0" err="1"/>
+              <a:t>piccoli</a:t>
+            </a:r>
+            <a:r>
+              <a:rPr lang="en-US" baseline="0" dirty="0"/>
+              <a:t>..)</a:t>
+            </a:r>
             <a:endParaRPr lang="en-US" dirty="0"/>
           </a:p>
         </p:txBody>
@@ -1045,6 +1043,392 @@
           <a:p>
             <a:fld id="{B38CEA09-33FA-4F6C-9D30-5FB0AA0E11C3}" type="slidenum">
               <a:rPr lang="it-IT" smtClean="0"/>
+              <a:t>30</a:t>
+            </a:fld>
+            <a:endParaRPr lang="it-IT" dirty="0"/>
+          </a:p>
+        </p:txBody>
+      </p:sp>
+    </p:spTree>
+    <p:extLst>
+      <p:ext uri="{BB962C8B-B14F-4D97-AF65-F5344CB8AC3E}">
+        <p14:creationId xmlns:p14="http://schemas.microsoft.com/office/powerpoint/2010/main" val="199411169"/>
+      </p:ext>
+    </p:extLst>
+  </p:cSld>
+  <p:clrMapOvr>
+    <a:masterClrMapping/>
+  </p:clrMapOvr>
+</p:notes>
+</file>
+
+<file path=ppt/notesSlides/notesSlide13.xml><?xml version="1.0" encoding="utf-8"?>
+<p:notes xmlns:a="http://schemas.openxmlformats.org/drawingml/2006/main" xmlns:r="http://schemas.openxmlformats.org/officeDocument/2006/relationships" xmlns:p="http://schemas.openxmlformats.org/presentationml/2006/main">
+  <p:cSld>
+    <p:spTree>
+      <p:nvGrpSpPr>
+        <p:cNvPr id="1" name=""/>
+        <p:cNvGrpSpPr/>
+        <p:nvPr/>
+      </p:nvGrpSpPr>
+      <p:grpSpPr>
+        <a:xfrm>
+          <a:off x="0" y="0"/>
+          <a:ext cx="0" cy="0"/>
+          <a:chOff x="0" y="0"/>
+          <a:chExt cx="0" cy="0"/>
+        </a:xfrm>
+      </p:grpSpPr>
+      <p:sp>
+        <p:nvSpPr>
+          <p:cNvPr id="2" name="Segnaposto immagine diapositiva 1"/>
+          <p:cNvSpPr>
+            <a:spLocks noGrp="1" noRot="1" noChangeAspect="1"/>
+          </p:cNvSpPr>
+          <p:nvPr>
+            <p:ph type="sldImg"/>
+          </p:nvPr>
+        </p:nvSpPr>
+        <p:spPr/>
+      </p:sp>
+      <p:sp>
+        <p:nvSpPr>
+          <p:cNvPr id="3" name="Segnaposto note 2"/>
+          <p:cNvSpPr>
+            <a:spLocks noGrp="1"/>
+          </p:cNvSpPr>
+          <p:nvPr>
+            <p:ph type="body" idx="1"/>
+          </p:nvPr>
+        </p:nvSpPr>
+        <p:spPr/>
+        <p:txBody>
+          <a:bodyPr/>
+          <a:lstStyle/>
+          <a:p>
+            <a:r>
+              <a:rPr lang="it-IT" dirty="0"/>
+              <a:t>La penultima non va</a:t>
+            </a:r>
+          </a:p>
+        </p:txBody>
+      </p:sp>
+      <p:sp>
+        <p:nvSpPr>
+          <p:cNvPr id="4" name="Segnaposto numero diapositiva 3"/>
+          <p:cNvSpPr>
+            <a:spLocks noGrp="1"/>
+          </p:cNvSpPr>
+          <p:nvPr>
+            <p:ph type="sldNum" sz="quarter" idx="5"/>
+          </p:nvPr>
+        </p:nvSpPr>
+        <p:spPr/>
+        <p:txBody>
+          <a:bodyPr/>
+          <a:lstStyle/>
+          <a:p>
+            <a:fld id="{B38CEA09-33FA-4F6C-9D30-5FB0AA0E11C3}" type="slidenum">
+              <a:rPr lang="it-IT" smtClean="0"/>
+              <a:t>31</a:t>
+            </a:fld>
+            <a:endParaRPr lang="it-IT" dirty="0"/>
+          </a:p>
+        </p:txBody>
+      </p:sp>
+    </p:spTree>
+    <p:extLst>
+      <p:ext uri="{BB962C8B-B14F-4D97-AF65-F5344CB8AC3E}">
+        <p14:creationId xmlns:p14="http://schemas.microsoft.com/office/powerpoint/2010/main" val="2620812623"/>
+      </p:ext>
+    </p:extLst>
+  </p:cSld>
+  <p:clrMapOvr>
+    <a:masterClrMapping/>
+  </p:clrMapOvr>
+</p:notes>
+</file>
+
+<file path=ppt/notesSlides/notesSlide14.xml><?xml version="1.0" encoding="utf-8"?>
+<p:notes xmlns:a="http://schemas.openxmlformats.org/drawingml/2006/main" xmlns:r="http://schemas.openxmlformats.org/officeDocument/2006/relationships" xmlns:p="http://schemas.openxmlformats.org/presentationml/2006/main">
+  <p:cSld>
+    <p:spTree>
+      <p:nvGrpSpPr>
+        <p:cNvPr id="1" name=""/>
+        <p:cNvGrpSpPr/>
+        <p:nvPr/>
+      </p:nvGrpSpPr>
+      <p:grpSpPr>
+        <a:xfrm>
+          <a:off x="0" y="0"/>
+          <a:ext cx="0" cy="0"/>
+          <a:chOff x="0" y="0"/>
+          <a:chExt cx="0" cy="0"/>
+        </a:xfrm>
+      </p:grpSpPr>
+      <p:sp>
+        <p:nvSpPr>
+          <p:cNvPr id="2" name="Segnaposto immagine diapositiva 1"/>
+          <p:cNvSpPr>
+            <a:spLocks noGrp="1" noRot="1" noChangeAspect="1"/>
+          </p:cNvSpPr>
+          <p:nvPr>
+            <p:ph type="sldImg"/>
+          </p:nvPr>
+        </p:nvSpPr>
+        <p:spPr/>
+      </p:sp>
+      <p:sp>
+        <p:nvSpPr>
+          <p:cNvPr id="3" name="Segnaposto note 2"/>
+          <p:cNvSpPr>
+            <a:spLocks noGrp="1"/>
+          </p:cNvSpPr>
+          <p:nvPr>
+            <p:ph type="body" idx="1"/>
+          </p:nvPr>
+        </p:nvSpPr>
+        <p:spPr/>
+        <p:txBody>
+          <a:bodyPr/>
+          <a:lstStyle/>
+          <a:p>
+            <a:endParaRPr lang="en-US" dirty="0"/>
+          </a:p>
+        </p:txBody>
+      </p:sp>
+      <p:sp>
+        <p:nvSpPr>
+          <p:cNvPr id="4" name="Segnaposto numero diapositiva 3"/>
+          <p:cNvSpPr>
+            <a:spLocks noGrp="1"/>
+          </p:cNvSpPr>
+          <p:nvPr>
+            <p:ph type="sldNum" sz="quarter" idx="10"/>
+          </p:nvPr>
+        </p:nvSpPr>
+        <p:spPr/>
+        <p:txBody>
+          <a:bodyPr/>
+          <a:lstStyle/>
+          <a:p>
+            <a:fld id="{B38CEA09-33FA-4F6C-9D30-5FB0AA0E11C3}" type="slidenum">
+              <a:rPr lang="it-IT" smtClean="0"/>
+              <a:t>42</a:t>
+            </a:fld>
+            <a:endParaRPr lang="it-IT" dirty="0"/>
+          </a:p>
+        </p:txBody>
+      </p:sp>
+    </p:spTree>
+    <p:extLst>
+      <p:ext uri="{BB962C8B-B14F-4D97-AF65-F5344CB8AC3E}">
+        <p14:creationId xmlns:p14="http://schemas.microsoft.com/office/powerpoint/2010/main" val="134689389"/>
+      </p:ext>
+    </p:extLst>
+  </p:cSld>
+  <p:clrMapOvr>
+    <a:masterClrMapping/>
+  </p:clrMapOvr>
+</p:notes>
+</file>
+
+<file path=ppt/notesSlides/notesSlide15.xml><?xml version="1.0" encoding="utf-8"?>
+<p:notes xmlns:a="http://schemas.openxmlformats.org/drawingml/2006/main" xmlns:r="http://schemas.openxmlformats.org/officeDocument/2006/relationships" xmlns:p="http://schemas.openxmlformats.org/presentationml/2006/main">
+  <p:cSld>
+    <p:spTree>
+      <p:nvGrpSpPr>
+        <p:cNvPr id="1" name=""/>
+        <p:cNvGrpSpPr/>
+        <p:nvPr/>
+      </p:nvGrpSpPr>
+      <p:grpSpPr>
+        <a:xfrm>
+          <a:off x="0" y="0"/>
+          <a:ext cx="0" cy="0"/>
+          <a:chOff x="0" y="0"/>
+          <a:chExt cx="0" cy="0"/>
+        </a:xfrm>
+      </p:grpSpPr>
+      <p:sp>
+        <p:nvSpPr>
+          <p:cNvPr id="2" name="Segnaposto immagine diapositiva 1"/>
+          <p:cNvSpPr>
+            <a:spLocks noGrp="1" noRot="1" noChangeAspect="1"/>
+          </p:cNvSpPr>
+          <p:nvPr>
+            <p:ph type="sldImg"/>
+          </p:nvPr>
+        </p:nvSpPr>
+        <p:spPr/>
+      </p:sp>
+      <p:sp>
+        <p:nvSpPr>
+          <p:cNvPr id="3" name="Segnaposto note 2"/>
+          <p:cNvSpPr>
+            <a:spLocks noGrp="1"/>
+          </p:cNvSpPr>
+          <p:nvPr>
+            <p:ph type="body" idx="1"/>
+          </p:nvPr>
+        </p:nvSpPr>
+        <p:spPr/>
+        <p:txBody>
+          <a:bodyPr/>
+          <a:lstStyle/>
+          <a:p>
+            <a:r>
+              <a:rPr lang="en-US" dirty="0" err="1"/>
+              <a:t>Attenzione</a:t>
+            </a:r>
+            <a:r>
+              <a:rPr lang="en-US" dirty="0"/>
+              <a:t>! </a:t>
+            </a:r>
+            <a:r>
+              <a:rPr lang="en-US" dirty="0" err="1"/>
+              <a:t>Nel</a:t>
+            </a:r>
+            <a:r>
+              <a:rPr lang="en-US" dirty="0"/>
+              <a:t> </a:t>
+            </a:r>
+            <a:r>
+              <a:rPr lang="en-US" dirty="0" err="1"/>
+              <a:t>corso</a:t>
+            </a:r>
+            <a:r>
+              <a:rPr lang="en-US" dirty="0"/>
+              <a:t> di </a:t>
+            </a:r>
+            <a:r>
+              <a:rPr lang="en-US" dirty="0" err="1"/>
+              <a:t>riferimento</a:t>
+            </a:r>
+            <a:r>
+              <a:rPr lang="en-US" dirty="0"/>
+              <a:t> (DS220) </a:t>
+            </a:r>
+            <a:r>
+              <a:rPr lang="en-US" dirty="0" err="1"/>
+              <a:t>viene</a:t>
+            </a:r>
+            <a:r>
+              <a:rPr lang="en-US" dirty="0"/>
+              <a:t> </a:t>
+            </a:r>
+            <a:r>
+              <a:rPr lang="en-US" dirty="0" err="1"/>
+              <a:t>detta</a:t>
+            </a:r>
+            <a:r>
+              <a:rPr lang="en-US" dirty="0"/>
+              <a:t> </a:t>
+            </a:r>
+            <a:r>
+              <a:rPr lang="en-US" dirty="0" err="1"/>
+              <a:t>una</a:t>
+            </a:r>
+            <a:r>
+              <a:rPr lang="en-US" dirty="0"/>
+              <a:t> </a:t>
+            </a:r>
+            <a:r>
+              <a:rPr lang="en-US" dirty="0" err="1"/>
+              <a:t>cosa</a:t>
+            </a:r>
+            <a:r>
+              <a:rPr lang="en-US" dirty="0"/>
+              <a:t> </a:t>
+            </a:r>
+            <a:r>
+              <a:rPr lang="en-US" dirty="0" err="1"/>
+              <a:t>profondamente</a:t>
+            </a:r>
+            <a:r>
+              <a:rPr lang="en-US" dirty="0"/>
+              <a:t> </a:t>
+            </a:r>
+            <a:r>
+              <a:rPr lang="en-US" dirty="0" err="1"/>
+              <a:t>sbagliata</a:t>
+            </a:r>
+            <a:r>
+              <a:rPr lang="en-US" dirty="0"/>
+              <a:t>, </a:t>
+            </a:r>
+            <a:r>
+              <a:rPr lang="en-US" dirty="0" err="1"/>
+              <a:t>ossia</a:t>
+            </a:r>
+            <a:r>
+              <a:rPr lang="en-US" baseline="0" dirty="0"/>
+              <a:t> </a:t>
+            </a:r>
+            <a:r>
+              <a:rPr lang="en-US" baseline="0" dirty="0" err="1"/>
+              <a:t>che</a:t>
+            </a:r>
+            <a:r>
+              <a:rPr lang="en-US" baseline="0" dirty="0"/>
+              <a:t> </a:t>
+            </a:r>
+            <a:r>
+              <a:rPr lang="en-US" baseline="0" dirty="0" err="1"/>
+              <a:t>il</a:t>
+            </a:r>
+            <a:r>
+              <a:rPr lang="en-US" baseline="0" dirty="0"/>
+              <a:t> DBMS prima fa </a:t>
+            </a:r>
+            <a:r>
+              <a:rPr lang="en-US" baseline="0" dirty="0" err="1"/>
+              <a:t>il</a:t>
+            </a:r>
+            <a:r>
+              <a:rPr lang="en-US" baseline="0" dirty="0"/>
+              <a:t> join, poi </a:t>
+            </a:r>
+            <a:r>
+              <a:rPr lang="en-US" baseline="0" dirty="0" err="1"/>
+              <a:t>il</a:t>
+            </a:r>
+            <a:r>
+              <a:rPr lang="en-US" baseline="0" dirty="0"/>
+              <a:t> </a:t>
+            </a:r>
+            <a:r>
+              <a:rPr lang="en-US" baseline="0" dirty="0" err="1"/>
+              <a:t>filtro</a:t>
+            </a:r>
+            <a:r>
+              <a:rPr lang="en-US" baseline="0" dirty="0"/>
+              <a:t>. </a:t>
+            </a:r>
+            <a:endParaRPr lang="en-US" dirty="0"/>
+          </a:p>
+          <a:p>
+            <a:endParaRPr lang="en-US" dirty="0"/>
+          </a:p>
+        </p:txBody>
+      </p:sp>
+      <p:sp>
+        <p:nvSpPr>
+          <p:cNvPr id="4" name="Segnaposto numero diapositiva 3"/>
+          <p:cNvSpPr>
+            <a:spLocks noGrp="1"/>
+          </p:cNvSpPr>
+          <p:nvPr>
+            <p:ph type="sldNum" sz="quarter" idx="10"/>
+          </p:nvPr>
+        </p:nvSpPr>
+        <p:spPr/>
+        <p:txBody>
+          <a:bodyPr/>
+          <a:lstStyle/>
+          <a:p>
+            <a:fld id="{B38CEA09-33FA-4F6C-9D30-5FB0AA0E11C3}" type="slidenum">
+              <a:rPr lang="it-IT" smtClean="0"/>
               <a:t>47</a:t>
             </a:fld>
             <a:endParaRPr lang="it-IT" dirty="0"/>
@@ -1064,7 +1448,335 @@
 </p:notes>
 </file>
 
-<file path=ppt/notesSlides/notesSlide13.xml><?xml version="1.0" encoding="utf-8"?>
+<file path=ppt/notesSlides/notesSlide16.xml><?xml version="1.0" encoding="utf-8"?>
+<p:notes xmlns:a="http://schemas.openxmlformats.org/drawingml/2006/main" xmlns:r="http://schemas.openxmlformats.org/officeDocument/2006/relationships" xmlns:p="http://schemas.openxmlformats.org/presentationml/2006/main">
+  <p:cSld>
+    <p:spTree>
+      <p:nvGrpSpPr>
+        <p:cNvPr id="1" name=""/>
+        <p:cNvGrpSpPr/>
+        <p:nvPr/>
+      </p:nvGrpSpPr>
+      <p:grpSpPr>
+        <a:xfrm>
+          <a:off x="0" y="0"/>
+          <a:ext cx="0" cy="0"/>
+          <a:chOff x="0" y="0"/>
+          <a:chExt cx="0" cy="0"/>
+        </a:xfrm>
+      </p:grpSpPr>
+      <p:sp>
+        <p:nvSpPr>
+          <p:cNvPr id="2" name="Segnaposto immagine diapositiva 1"/>
+          <p:cNvSpPr>
+            <a:spLocks noGrp="1" noRot="1" noChangeAspect="1"/>
+          </p:cNvSpPr>
+          <p:nvPr>
+            <p:ph type="sldImg"/>
+          </p:nvPr>
+        </p:nvSpPr>
+        <p:spPr/>
+      </p:sp>
+      <p:sp>
+        <p:nvSpPr>
+          <p:cNvPr id="3" name="Segnaposto note 2"/>
+          <p:cNvSpPr>
+            <a:spLocks noGrp="1"/>
+          </p:cNvSpPr>
+          <p:nvPr>
+            <p:ph type="body" idx="1"/>
+          </p:nvPr>
+        </p:nvSpPr>
+        <p:spPr/>
+        <p:txBody>
+          <a:bodyPr/>
+          <a:lstStyle/>
+          <a:p>
+            <a:r>
+              <a:rPr lang="it-IT" dirty="0"/>
+              <a:t>Video id non è in chiave per non </a:t>
+            </a:r>
+            <a:r>
+              <a:rPr lang="it-IT"/>
+              <a:t>essere ridondanti</a:t>
+            </a:r>
+          </a:p>
+        </p:txBody>
+      </p:sp>
+      <p:sp>
+        <p:nvSpPr>
+          <p:cNvPr id="4" name="Segnaposto numero diapositiva 3"/>
+          <p:cNvSpPr>
+            <a:spLocks noGrp="1"/>
+          </p:cNvSpPr>
+          <p:nvPr>
+            <p:ph type="sldNum" sz="quarter" idx="5"/>
+          </p:nvPr>
+        </p:nvSpPr>
+        <p:spPr/>
+        <p:txBody>
+          <a:bodyPr/>
+          <a:lstStyle/>
+          <a:p>
+            <a:fld id="{B38CEA09-33FA-4F6C-9D30-5FB0AA0E11C3}" type="slidenum">
+              <a:rPr lang="it-IT" smtClean="0"/>
+              <a:t>49</a:t>
+            </a:fld>
+            <a:endParaRPr lang="it-IT" dirty="0"/>
+          </a:p>
+        </p:txBody>
+      </p:sp>
+    </p:spTree>
+    <p:extLst>
+      <p:ext uri="{BB962C8B-B14F-4D97-AF65-F5344CB8AC3E}">
+        <p14:creationId xmlns:p14="http://schemas.microsoft.com/office/powerpoint/2010/main" val="1518959614"/>
+      </p:ext>
+    </p:extLst>
+  </p:cSld>
+  <p:clrMapOvr>
+    <a:masterClrMapping/>
+  </p:clrMapOvr>
+</p:notes>
+</file>
+
+<file path=ppt/notesSlides/notesSlide17.xml><?xml version="1.0" encoding="utf-8"?>
+<p:notes xmlns:a="http://schemas.openxmlformats.org/drawingml/2006/main" xmlns:r="http://schemas.openxmlformats.org/officeDocument/2006/relationships" xmlns:p="http://schemas.openxmlformats.org/presentationml/2006/main">
+  <p:cSld>
+    <p:spTree>
+      <p:nvGrpSpPr>
+        <p:cNvPr id="1" name=""/>
+        <p:cNvGrpSpPr/>
+        <p:nvPr/>
+      </p:nvGrpSpPr>
+      <p:grpSpPr>
+        <a:xfrm>
+          <a:off x="0" y="0"/>
+          <a:ext cx="0" cy="0"/>
+          <a:chOff x="0" y="0"/>
+          <a:chExt cx="0" cy="0"/>
+        </a:xfrm>
+      </p:grpSpPr>
+      <p:sp>
+        <p:nvSpPr>
+          <p:cNvPr id="2" name="Segnaposto immagine diapositiva 1"/>
+          <p:cNvSpPr>
+            <a:spLocks noGrp="1" noRot="1" noChangeAspect="1"/>
+          </p:cNvSpPr>
+          <p:nvPr>
+            <p:ph type="sldImg"/>
+          </p:nvPr>
+        </p:nvSpPr>
+        <p:spPr/>
+      </p:sp>
+      <p:sp>
+        <p:nvSpPr>
+          <p:cNvPr id="3" name="Segnaposto note 2"/>
+          <p:cNvSpPr>
+            <a:spLocks noGrp="1"/>
+          </p:cNvSpPr>
+          <p:nvPr>
+            <p:ph type="body" idx="1"/>
+          </p:nvPr>
+        </p:nvSpPr>
+        <p:spPr/>
+        <p:txBody>
+          <a:bodyPr/>
+          <a:lstStyle/>
+          <a:p>
+            <a:r>
+              <a:rPr lang="it-IT" dirty="0"/>
+              <a:t>Oltre alla granularità del video, attenzione al personaggio (</a:t>
+            </a:r>
+            <a:r>
+              <a:rPr lang="it-IT" dirty="0" err="1"/>
+              <a:t>character_name</a:t>
+            </a:r>
+            <a:r>
+              <a:rPr lang="it-IT" dirty="0"/>
+              <a:t>)</a:t>
+            </a:r>
+          </a:p>
+          <a:p>
+            <a:endParaRPr lang="it-IT" dirty="0"/>
+          </a:p>
+          <a:p>
+            <a:r>
+              <a:rPr lang="it-IT" dirty="0"/>
+              <a:t>Clustering </a:t>
+            </a:r>
+            <a:r>
+              <a:rPr lang="it-IT" dirty="0" err="1"/>
+              <a:t>order</a:t>
+            </a:r>
+            <a:r>
+              <a:rPr lang="it-IT" dirty="0"/>
+              <a:t> by </a:t>
+            </a:r>
+            <a:r>
+              <a:rPr lang="it-IT" dirty="0" err="1"/>
+              <a:t>added_date</a:t>
+            </a:r>
+            <a:r>
+              <a:rPr lang="it-IT" dirty="0"/>
+              <a:t> </a:t>
+            </a:r>
+            <a:r>
+              <a:rPr lang="it-IT" dirty="0" err="1"/>
+              <a:t>desc</a:t>
+            </a:r>
+            <a:endParaRPr lang="it-IT" dirty="0"/>
+          </a:p>
+          <a:p>
+            <a:endParaRPr lang="it-IT" dirty="0"/>
+          </a:p>
+          <a:p>
+            <a:r>
+              <a:rPr lang="it-IT" dirty="0"/>
+              <a:t>Ridefinire </a:t>
+            </a:r>
+            <a:r>
+              <a:rPr lang="it-IT" dirty="0" err="1"/>
+              <a:t>type</a:t>
+            </a:r>
+            <a:r>
+              <a:rPr lang="it-IT" dirty="0"/>
+              <a:t> video </a:t>
+            </a:r>
+            <a:r>
+              <a:rPr lang="it-IT" dirty="0" err="1"/>
+              <a:t>encoding</a:t>
+            </a:r>
+            <a:r>
+              <a:rPr lang="it-IT" dirty="0"/>
+              <a:t>.</a:t>
+            </a:r>
+          </a:p>
+        </p:txBody>
+      </p:sp>
+      <p:sp>
+        <p:nvSpPr>
+          <p:cNvPr id="4" name="Segnaposto numero diapositiva 3"/>
+          <p:cNvSpPr>
+            <a:spLocks noGrp="1"/>
+          </p:cNvSpPr>
+          <p:nvPr>
+            <p:ph type="sldNum" sz="quarter" idx="5"/>
+          </p:nvPr>
+        </p:nvSpPr>
+        <p:spPr/>
+        <p:txBody>
+          <a:bodyPr/>
+          <a:lstStyle/>
+          <a:p>
+            <a:fld id="{B38CEA09-33FA-4F6C-9D30-5FB0AA0E11C3}" type="slidenum">
+              <a:rPr lang="it-IT" smtClean="0"/>
+              <a:t>52</a:t>
+            </a:fld>
+            <a:endParaRPr lang="it-IT" dirty="0"/>
+          </a:p>
+        </p:txBody>
+      </p:sp>
+    </p:spTree>
+    <p:extLst>
+      <p:ext uri="{BB962C8B-B14F-4D97-AF65-F5344CB8AC3E}">
+        <p14:creationId xmlns:p14="http://schemas.microsoft.com/office/powerpoint/2010/main" val="1769719923"/>
+      </p:ext>
+    </p:extLst>
+  </p:cSld>
+  <p:clrMapOvr>
+    <a:masterClrMapping/>
+  </p:clrMapOvr>
+</p:notes>
+</file>
+
+<file path=ppt/notesSlides/notesSlide18.xml><?xml version="1.0" encoding="utf-8"?>
+<p:notes xmlns:a="http://schemas.openxmlformats.org/drawingml/2006/main" xmlns:r="http://schemas.openxmlformats.org/officeDocument/2006/relationships" xmlns:p="http://schemas.openxmlformats.org/presentationml/2006/main">
+  <p:cSld>
+    <p:spTree>
+      <p:nvGrpSpPr>
+        <p:cNvPr id="1" name=""/>
+        <p:cNvGrpSpPr/>
+        <p:nvPr/>
+      </p:nvGrpSpPr>
+      <p:grpSpPr>
+        <a:xfrm>
+          <a:off x="0" y="0"/>
+          <a:ext cx="0" cy="0"/>
+          <a:chOff x="0" y="0"/>
+          <a:chExt cx="0" cy="0"/>
+        </a:xfrm>
+      </p:grpSpPr>
+      <p:sp>
+        <p:nvSpPr>
+          <p:cNvPr id="2" name="Segnaposto immagine diapositiva 1"/>
+          <p:cNvSpPr>
+            <a:spLocks noGrp="1" noRot="1" noChangeAspect="1"/>
+          </p:cNvSpPr>
+          <p:nvPr>
+            <p:ph type="sldImg"/>
+          </p:nvPr>
+        </p:nvSpPr>
+        <p:spPr/>
+      </p:sp>
+      <p:sp>
+        <p:nvSpPr>
+          <p:cNvPr id="3" name="Segnaposto note 2"/>
+          <p:cNvSpPr>
+            <a:spLocks noGrp="1"/>
+          </p:cNvSpPr>
+          <p:nvPr>
+            <p:ph type="body" idx="1"/>
+          </p:nvPr>
+        </p:nvSpPr>
+        <p:spPr/>
+        <p:txBody>
+          <a:bodyPr/>
+          <a:lstStyle/>
+          <a:p>
+            <a:r>
+              <a:rPr lang="it-IT" dirty="0"/>
+              <a:t>Un attore può avere più ruoli, per quello in chiave di clustering</a:t>
+            </a:r>
+          </a:p>
+        </p:txBody>
+      </p:sp>
+      <p:sp>
+        <p:nvSpPr>
+          <p:cNvPr id="4" name="Segnaposto numero diapositiva 3"/>
+          <p:cNvSpPr>
+            <a:spLocks noGrp="1"/>
+          </p:cNvSpPr>
+          <p:nvPr>
+            <p:ph type="sldNum" sz="quarter" idx="5"/>
+          </p:nvPr>
+        </p:nvSpPr>
+        <p:spPr/>
+        <p:txBody>
+          <a:bodyPr/>
+          <a:lstStyle/>
+          <a:p>
+            <a:fld id="{B38CEA09-33FA-4F6C-9D30-5FB0AA0E11C3}" type="slidenum">
+              <a:rPr lang="it-IT" smtClean="0"/>
+              <a:t>53</a:t>
+            </a:fld>
+            <a:endParaRPr lang="it-IT" dirty="0"/>
+          </a:p>
+        </p:txBody>
+      </p:sp>
+    </p:spTree>
+    <p:extLst>
+      <p:ext uri="{BB962C8B-B14F-4D97-AF65-F5344CB8AC3E}">
+        <p14:creationId xmlns:p14="http://schemas.microsoft.com/office/powerpoint/2010/main" val="1597129680"/>
+      </p:ext>
+    </p:extLst>
+  </p:cSld>
+  <p:clrMapOvr>
+    <a:masterClrMapping/>
+  </p:clrMapOvr>
+</p:notes>
+</file>
+
+<file path=ppt/notesSlides/notesSlide19.xml><?xml version="1.0" encoding="utf-8"?>
 <p:notes xmlns:a="http://schemas.openxmlformats.org/drawingml/2006/main" xmlns:r="http://schemas.openxmlformats.org/officeDocument/2006/relationships" xmlns:p="http://schemas.openxmlformats.org/presentationml/2006/main">
   <p:cSld>
     <p:spTree>
@@ -1711,15 +2423,7 @@
           <a:p>
             <a:r>
               <a:rPr lang="it-IT" dirty="0"/>
-              <a:t>Punto di partenza: ho un file </a:t>
-            </a:r>
-            <a:r>
-              <a:rPr lang="it-IT" dirty="0" err="1"/>
-              <a:t>csv</a:t>
-            </a:r>
-            <a:r>
-              <a:rPr lang="it-IT" dirty="0"/>
-              <a:t> con </a:t>
+              <a:t>Non mettere le parentesi fa si che non fanno parte entrambi di colonna di partizionamento</a:t>
             </a:r>
           </a:p>
         </p:txBody>
@@ -1731,7 +2435,7 @@
             <a:spLocks noGrp="1"/>
           </p:cNvSpPr>
           <p:nvPr>
-            <p:ph type="sldNum" sz="quarter" idx="10"/>
+            <p:ph type="sldNum" sz="quarter" idx="5"/>
           </p:nvPr>
         </p:nvSpPr>
         <p:spPr/>
@@ -1741,7 +2445,7 @@
           <a:p>
             <a:fld id="{B38CEA09-33FA-4F6C-9D30-5FB0AA0E11C3}" type="slidenum">
               <a:rPr lang="it-IT" smtClean="0"/>
-              <a:t>27</a:t>
+              <a:t>17</a:t>
             </a:fld>
             <a:endParaRPr lang="it-IT" dirty="0"/>
           </a:p>
@@ -1750,7 +2454,7 @@
     </p:spTree>
     <p:extLst>
       <p:ext uri="{BB962C8B-B14F-4D97-AF65-F5344CB8AC3E}">
-        <p14:creationId xmlns:p14="http://schemas.microsoft.com/office/powerpoint/2010/main" val="3749314019"/>
+        <p14:creationId xmlns:p14="http://schemas.microsoft.com/office/powerpoint/2010/main" val="3835903786"/>
       </p:ext>
     </p:extLst>
   </p:cSld>
@@ -1806,15 +2510,7 @@
           <a:p>
             <a:r>
               <a:rPr lang="it-IT" dirty="0"/>
-              <a:t>Punto di partenza: ho un file </a:t>
-            </a:r>
-            <a:r>
-              <a:rPr lang="it-IT" dirty="0" err="1"/>
-              <a:t>csv</a:t>
-            </a:r>
-            <a:r>
-              <a:rPr lang="it-IT" dirty="0"/>
-              <a:t> con </a:t>
+              <a:t>Di default ordine ASC</a:t>
             </a:r>
           </a:p>
         </p:txBody>
@@ -1826,7 +2522,7 @@
             <a:spLocks noGrp="1"/>
           </p:cNvSpPr>
           <p:nvPr>
-            <p:ph type="sldNum" sz="quarter" idx="10"/>
+            <p:ph type="sldNum" sz="quarter" idx="5"/>
           </p:nvPr>
         </p:nvSpPr>
         <p:spPr/>
@@ -1836,7 +2532,7 @@
           <a:p>
             <a:fld id="{B38CEA09-33FA-4F6C-9D30-5FB0AA0E11C3}" type="slidenum">
               <a:rPr lang="it-IT" smtClean="0"/>
-              <a:t>28</a:t>
+              <a:t>24</a:t>
             </a:fld>
             <a:endParaRPr lang="it-IT" dirty="0"/>
           </a:p>
@@ -1845,7 +2541,7 @@
     </p:spTree>
     <p:extLst>
       <p:ext uri="{BB962C8B-B14F-4D97-AF65-F5344CB8AC3E}">
-        <p14:creationId xmlns:p14="http://schemas.microsoft.com/office/powerpoint/2010/main" val="1763239004"/>
+        <p14:creationId xmlns:p14="http://schemas.microsoft.com/office/powerpoint/2010/main" val="1735177409"/>
       </p:ext>
     </p:extLst>
   </p:cSld>
@@ -1900,42 +2596,17 @@
           <a:lstStyle/>
           <a:p>
             <a:r>
-              <a:rPr lang="en-US" dirty="0"/>
-              <a:t>DESCRIBE TABLE</a:t>
-            </a:r>
-            <a:r>
-              <a:rPr lang="en-US" baseline="0" dirty="0"/>
-              <a:t> -&gt; </a:t>
-            </a:r>
-            <a:r>
-              <a:rPr lang="en-US" baseline="0" dirty="0" err="1"/>
-              <a:t>notare</a:t>
-            </a:r>
-            <a:r>
-              <a:rPr lang="en-US" baseline="0" dirty="0"/>
-              <a:t> </a:t>
-            </a:r>
-            <a:r>
-              <a:rPr lang="en-US" baseline="0" dirty="0" err="1"/>
-              <a:t>l'ordine</a:t>
-            </a:r>
-            <a:r>
-              <a:rPr lang="en-US" baseline="0" dirty="0"/>
-              <a:t> </a:t>
-            </a:r>
-            <a:r>
-              <a:rPr lang="en-US" baseline="0" dirty="0" err="1"/>
-              <a:t>delle</a:t>
-            </a:r>
-            <a:r>
-              <a:rPr lang="en-US" baseline="0" dirty="0"/>
-              <a:t> </a:t>
-            </a:r>
-            <a:r>
-              <a:rPr lang="en-US" baseline="0" dirty="0" err="1"/>
-              <a:t>colonne</a:t>
-            </a:r>
-            <a:endParaRPr lang="en-US" dirty="0"/>
+              <a:rPr lang="it-IT" dirty="0"/>
+              <a:t>Punto di partenza: ho un file </a:t>
+            </a:r>
+            <a:r>
+              <a:rPr lang="it-IT" dirty="0" err="1"/>
+              <a:t>csv</a:t>
+            </a:r>
+            <a:r>
+              <a:rPr lang="it-IT" dirty="0"/>
+              <a:t> con </a:t>
+            </a:r>
           </a:p>
         </p:txBody>
       </p:sp>
@@ -1956,7 +2627,7 @@
           <a:p>
             <a:fld id="{B38CEA09-33FA-4F6C-9D30-5FB0AA0E11C3}" type="slidenum">
               <a:rPr lang="it-IT" smtClean="0"/>
-              <a:t>29</a:t>
+              <a:t>27</a:t>
             </a:fld>
             <a:endParaRPr lang="it-IT" dirty="0"/>
           </a:p>
@@ -1965,7 +2636,7 @@
     </p:spTree>
     <p:extLst>
       <p:ext uri="{BB962C8B-B14F-4D97-AF65-F5344CB8AC3E}">
-        <p14:creationId xmlns:p14="http://schemas.microsoft.com/office/powerpoint/2010/main" val="2128317767"/>
+        <p14:creationId xmlns:p14="http://schemas.microsoft.com/office/powerpoint/2010/main" val="3749314019"/>
       </p:ext>
     </p:extLst>
   </p:cSld>
@@ -2201,7 +2872,7 @@
           <a:p>
             <a:fld id="{65061730-2F0F-4B55-83F4-33856D80FFD7}" type="datetime1">
               <a:rPr lang="en-US" smtClean="0"/>
-              <a:t>2/9/2022</a:t>
+              <a:t>2/17/2023</a:t>
             </a:fld>
             <a:endParaRPr lang="en-US" dirty="0"/>
           </a:p>
@@ -2409,7 +3080,7 @@
           <a:p>
             <a:fld id="{BE1035D6-F845-4530-B289-DD4EC9CAE501}" type="datetime1">
               <a:rPr lang="en-US" smtClean="0"/>
-              <a:t>2/9/2022</a:t>
+              <a:t>2/17/2023</a:t>
             </a:fld>
             <a:endParaRPr lang="en-US" dirty="0"/>
           </a:p>
@@ -2665,7 +3336,7 @@
           <a:p>
             <a:fld id="{EDD3DE46-844C-40F1-AAA7-78AD6518D44C}" type="datetime1">
               <a:rPr lang="en-US" smtClean="0"/>
-              <a:t>2/9/2022</a:t>
+              <a:t>2/17/2023</a:t>
             </a:fld>
             <a:endParaRPr lang="en-US" dirty="0"/>
           </a:p>
@@ -2837,7 +3508,7 @@
           <a:p>
             <a:fld id="{1FCF7768-7A83-43C9-9C3D-95CD5F68D7E2}" type="datetime1">
               <a:rPr lang="en-US" smtClean="0"/>
-              <a:t>2/9/2022</a:t>
+              <a:t>2/17/2023</a:t>
             </a:fld>
             <a:endParaRPr lang="en-US" dirty="0"/>
           </a:p>
@@ -3180,7 +3851,7 @@
           <a:p>
             <a:fld id="{58DD30C4-1715-4BC2-976F-EF7BA4DC70B4}" type="datetime1">
               <a:rPr lang="en-US" smtClean="0"/>
-              <a:t>2/9/2022</a:t>
+              <a:t>2/17/2023</a:t>
             </a:fld>
             <a:endParaRPr lang="en-US" dirty="0"/>
           </a:p>
@@ -3455,7 +4126,7 @@
           <a:p>
             <a:fld id="{E92CF10C-564E-48D4-BE3A-05BB93A7F107}" type="datetime1">
               <a:rPr lang="en-US" smtClean="0"/>
-              <a:t>2/9/2022</a:t>
+              <a:t>2/17/2023</a:t>
             </a:fld>
             <a:endParaRPr lang="en-US" dirty="0"/>
           </a:p>
@@ -3834,7 +4505,7 @@
           <a:p>
             <a:fld id="{CEF5B9DB-33AD-46E7-ADFD-C52815BFEA09}" type="datetime1">
               <a:rPr lang="en-US" smtClean="0"/>
-              <a:t>2/9/2022</a:t>
+              <a:t>2/17/2023</a:t>
             </a:fld>
             <a:endParaRPr lang="en-US" dirty="0"/>
           </a:p>
@@ -3952,7 +4623,7 @@
           <a:p>
             <a:fld id="{EFC02824-932F-46A1-8D0D-D52979BEE663}" type="datetime1">
               <a:rPr lang="en-US" smtClean="0"/>
-              <a:t>2/9/2022</a:t>
+              <a:t>2/17/2023</a:t>
             </a:fld>
             <a:endParaRPr lang="en-US" dirty="0"/>
           </a:p>
@@ -4123,7 +4794,7 @@
           <a:p>
             <a:fld id="{36233CB2-1968-4F08-9AB4-83693145DE18}" type="datetime1">
               <a:rPr lang="en-US" smtClean="0"/>
-              <a:t>2/9/2022</a:t>
+              <a:t>2/17/2023</a:t>
             </a:fld>
             <a:endParaRPr lang="en-US" dirty="0"/>
           </a:p>
@@ -4478,7 +5149,7 @@
           <a:p>
             <a:fld id="{F8F6D7E5-1322-4764-A2E4-7B71FFFDE726}" type="datetime1">
               <a:rPr lang="en-US" smtClean="0"/>
-              <a:t>2/9/2022</a:t>
+              <a:t>2/17/2023</a:t>
             </a:fld>
             <a:endParaRPr lang="en-US" dirty="0"/>
           </a:p>
@@ -4856,7 +5527,7 @@
           <a:p>
             <a:fld id="{E26D0A1A-929F-4DC6-9A8A-74A15252C912}" type="datetime1">
               <a:rPr lang="en-US" smtClean="0"/>
-              <a:t>2/9/2022</a:t>
+              <a:t>2/17/2023</a:t>
             </a:fld>
             <a:endParaRPr lang="en-US" dirty="0"/>
           </a:p>
@@ -5143,7 +5814,7 @@
           <a:p>
             <a:fld id="{EDD3DE46-844C-40F1-AAA7-78AD6518D44C}" type="datetime1">
               <a:rPr lang="en-US" smtClean="0"/>
-              <a:t>2/9/2022</a:t>
+              <a:t>2/17/2023</a:t>
             </a:fld>
             <a:endParaRPr lang="en-US" dirty="0"/>
           </a:p>
@@ -11642,8 +12313,8 @@
         </p:nvSpPr>
         <p:spPr>
           <a:xfrm>
-            <a:off x="5195601" y="2096135"/>
-            <a:ext cx="3318537" cy="2277547"/>
+            <a:off x="5195602" y="2096135"/>
+            <a:ext cx="3541170" cy="3754874"/>
           </a:xfrm>
           <a:prstGeom prst="rect">
             <a:avLst/>
@@ -11651,7 +12322,7 @@
           <a:noFill/>
         </p:spPr>
         <p:txBody>
-          <a:bodyPr wrap="none" rtlCol="0">
+          <a:bodyPr wrap="square" rtlCol="0">
             <a:spAutoFit/>
           </a:bodyPr>
           <a:lstStyle/>
@@ -11786,6 +12457,189 @@
                 <a:latin typeface="Courier New" panose="02070309020205020404" pitchFamily="49" charset="0"/>
               </a:rPr>
               <a:t>2015</a:t>
+            </a:r>
+            <a:r>
+              <a:rPr lang="en-US" sz="1400" dirty="0">
+                <a:solidFill>
+                  <a:srgbClr val="374C51"/>
+                </a:solidFill>
+                <a:latin typeface="Courier New" panose="02070309020205020404" pitchFamily="49" charset="0"/>
+              </a:rPr>
+              <a:t>; </a:t>
+            </a:r>
+          </a:p>
+          <a:p>
+            <a:endParaRPr lang="en-US" sz="1400" b="1" u="sng" dirty="0">
+              <a:solidFill>
+                <a:srgbClr val="374C51"/>
+              </a:solidFill>
+              <a:latin typeface="Courier New" panose="02070309020205020404" pitchFamily="49" charset="0"/>
+            </a:endParaRPr>
+          </a:p>
+          <a:p>
+            <a:r>
+              <a:rPr lang="en-US" sz="1400" b="1" u="sng" dirty="0" err="1">
+                <a:solidFill>
+                  <a:srgbClr val="374C51"/>
+                </a:solidFill>
+                <a:latin typeface="Courier New" panose="02070309020205020404" pitchFamily="49" charset="0"/>
+              </a:rPr>
+              <a:t>Queste</a:t>
+            </a:r>
+            <a:r>
+              <a:rPr lang="en-US" sz="1400" b="1" u="sng" dirty="0">
+                <a:solidFill>
+                  <a:srgbClr val="374C51"/>
+                </a:solidFill>
+                <a:latin typeface="Courier New" panose="02070309020205020404" pitchFamily="49" charset="0"/>
+              </a:rPr>
+              <a:t> non </a:t>
+            </a:r>
+            <a:r>
+              <a:rPr lang="en-US" sz="1400" b="1" u="sng" dirty="0" err="1">
+                <a:solidFill>
+                  <a:srgbClr val="374C51"/>
+                </a:solidFill>
+                <a:latin typeface="Courier New" panose="02070309020205020404" pitchFamily="49" charset="0"/>
+              </a:rPr>
+              <a:t>vanno</a:t>
+            </a:r>
+            <a:r>
+              <a:rPr lang="en-US" sz="1400" b="1" u="sng" dirty="0">
+                <a:solidFill>
+                  <a:srgbClr val="374C51"/>
+                </a:solidFill>
+                <a:latin typeface="Courier New" panose="02070309020205020404" pitchFamily="49" charset="0"/>
+              </a:rPr>
+              <a:t> e </a:t>
+            </a:r>
+            <a:r>
+              <a:rPr lang="en-US" sz="1400" b="1" u="sng" dirty="0" err="1">
+                <a:solidFill>
+                  <a:srgbClr val="374C51"/>
+                </a:solidFill>
+                <a:latin typeface="Courier New" panose="02070309020205020404" pitchFamily="49" charset="0"/>
+              </a:rPr>
+              <a:t>scopriremo</a:t>
+            </a:r>
+            <a:r>
+              <a:rPr lang="en-US" sz="1400" b="1" u="sng" dirty="0">
+                <a:solidFill>
+                  <a:srgbClr val="374C51"/>
+                </a:solidFill>
+                <a:latin typeface="Courier New" panose="02070309020205020404" pitchFamily="49" charset="0"/>
+              </a:rPr>
+              <a:t> </a:t>
+            </a:r>
+            <a:r>
+              <a:rPr lang="en-US" sz="1400" b="1" u="sng" dirty="0" err="1">
+                <a:solidFill>
+                  <a:srgbClr val="374C51"/>
+                </a:solidFill>
+                <a:latin typeface="Courier New" panose="02070309020205020404" pitchFamily="49" charset="0"/>
+              </a:rPr>
+              <a:t>perchè</a:t>
+            </a:r>
+            <a:endParaRPr lang="en-US" sz="1400" b="1" u="sng" dirty="0">
+              <a:solidFill>
+                <a:srgbClr val="374C51"/>
+              </a:solidFill>
+              <a:latin typeface="Courier New" panose="02070309020205020404" pitchFamily="49" charset="0"/>
+            </a:endParaRPr>
+          </a:p>
+          <a:p>
+            <a:endParaRPr lang="en-US" sz="1400" b="1" dirty="0">
+              <a:solidFill>
+                <a:srgbClr val="374C51"/>
+              </a:solidFill>
+              <a:latin typeface="Courier New" panose="02070309020205020404" pitchFamily="49" charset="0"/>
+            </a:endParaRPr>
+          </a:p>
+          <a:p>
+            <a:r>
+              <a:rPr lang="en-US" sz="1400" b="1" dirty="0">
+                <a:solidFill>
+                  <a:srgbClr val="445588"/>
+                </a:solidFill>
+                <a:latin typeface="Courier New" panose="02070309020205020404" pitchFamily="49" charset="0"/>
+              </a:rPr>
+              <a:t>SELECT</a:t>
+            </a:r>
+            <a:r>
+              <a:rPr lang="en-US" sz="1400" dirty="0">
+                <a:solidFill>
+                  <a:srgbClr val="374C51"/>
+                </a:solidFill>
+                <a:latin typeface="Courier New" panose="02070309020205020404" pitchFamily="49" charset="0"/>
+              </a:rPr>
+              <a:t> * </a:t>
+            </a:r>
+          </a:p>
+          <a:p>
+            <a:r>
+              <a:rPr lang="en-US" sz="1400" b="1" dirty="0">
+                <a:solidFill>
+                  <a:srgbClr val="000000"/>
+                </a:solidFill>
+                <a:latin typeface="Courier New" panose="02070309020205020404" pitchFamily="49" charset="0"/>
+              </a:rPr>
+              <a:t>FROM</a:t>
+            </a:r>
+            <a:r>
+              <a:rPr lang="en-US" sz="1400" dirty="0">
+                <a:solidFill>
+                  <a:srgbClr val="374C51"/>
+                </a:solidFill>
+                <a:latin typeface="Courier New" panose="02070309020205020404" pitchFamily="49" charset="0"/>
+              </a:rPr>
+              <a:t> </a:t>
+            </a:r>
+            <a:r>
+              <a:rPr lang="en-US" sz="1400" dirty="0" err="1">
+                <a:solidFill>
+                  <a:srgbClr val="374C51"/>
+                </a:solidFill>
+                <a:latin typeface="Courier New" panose="02070309020205020404" pitchFamily="49" charset="0"/>
+              </a:rPr>
+              <a:t>videos_by_title_year</a:t>
+            </a:r>
+            <a:r>
+              <a:rPr lang="en-US" sz="1400" dirty="0">
+                <a:solidFill>
+                  <a:srgbClr val="374C51"/>
+                </a:solidFill>
+                <a:latin typeface="Courier New" panose="02070309020205020404" pitchFamily="49" charset="0"/>
+              </a:rPr>
+              <a:t> </a:t>
+            </a:r>
+          </a:p>
+          <a:p>
+            <a:r>
+              <a:rPr lang="en-US" sz="1400" b="1" dirty="0">
+                <a:solidFill>
+                  <a:srgbClr val="000000"/>
+                </a:solidFill>
+                <a:latin typeface="Courier New" panose="02070309020205020404" pitchFamily="49" charset="0"/>
+              </a:rPr>
+              <a:t>WHERE</a:t>
+            </a:r>
+            <a:r>
+              <a:rPr lang="en-US" sz="1400" dirty="0">
+                <a:solidFill>
+                  <a:srgbClr val="374C51"/>
+                </a:solidFill>
+                <a:latin typeface="Courier New" panose="02070309020205020404" pitchFamily="49" charset="0"/>
+              </a:rPr>
+              <a:t> title = </a:t>
+            </a:r>
+            <a:r>
+              <a:rPr lang="en-US" sz="1400" dirty="0">
+                <a:solidFill>
+                  <a:srgbClr val="DD1144"/>
+                </a:solidFill>
+                <a:latin typeface="inherit"/>
+              </a:rPr>
+              <a:t>'Sleepy Grumpy Cat'</a:t>
             </a:r>
             <a:r>
               <a:rPr lang="en-US" sz="1400" dirty="0">
@@ -14151,7 +15005,7 @@
           <p:nvPr/>
         </p:nvPicPr>
         <p:blipFill>
-          <a:blip r:embed="rId2"/>
+          <a:blip r:embed="rId3"/>
           <a:stretch>
             <a:fillRect/>
           </a:stretch>
@@ -18873,7 +19727,7 @@
         <p:spPr>
           <a:xfrm>
             <a:off x="822960" y="1985306"/>
-            <a:ext cx="4756174" cy="3323987"/>
+            <a:ext cx="4530471" cy="3323987"/>
           </a:xfrm>
           <a:prstGeom prst="rect">
             <a:avLst/>
@@ -19378,13 +20232,13 @@
               <a:t>2015</a:t>
             </a:r>
             <a:r>
-              <a:rPr lang="en-US" sz="1400" dirty="0">
-                <a:solidFill>
-                  <a:srgbClr val="374C51"/>
-                </a:solidFill>
-                <a:latin typeface="Courier New" panose="02070309020205020404" pitchFamily="49" charset="0"/>
-              </a:rPr>
-              <a:t>;</a:t>
+              <a:rPr lang="en-US" sz="1400" b="1" dirty="0">
+                <a:solidFill>
+                  <a:srgbClr val="000000"/>
+                </a:solidFill>
+                <a:latin typeface="Courier New" panose="02070309020205020404" pitchFamily="49" charset="0"/>
+              </a:rPr>
+              <a:t> ALLOW FILTERING;</a:t>
             </a:r>
           </a:p>
           <a:p>
@@ -21902,7 +22756,7 @@
         </p:nvSpPr>
         <p:spPr>
           <a:xfrm>
-            <a:off x="822959" y="3857414"/>
+            <a:off x="822959" y="3954950"/>
             <a:ext cx="3887603" cy="2308324"/>
           </a:xfrm>
           <a:prstGeom prst="rect">
@@ -25234,7 +26088,7 @@
         </p:nvSpPr>
         <p:spPr>
           <a:xfrm>
-            <a:off x="822960" y="1887554"/>
+            <a:off x="822960" y="1924130"/>
             <a:ext cx="5769528" cy="3970318"/>
           </a:xfrm>
           <a:prstGeom prst="rect">
@@ -27305,7 +28159,7 @@
           <p:nvPr/>
         </p:nvPicPr>
         <p:blipFill>
-          <a:blip r:embed="rId2"/>
+          <a:blip r:embed="rId3"/>
           <a:stretch>
             <a:fillRect/>
           </a:stretch>

</xml_diff>